<commit_message>
Added the final modified files
</commit_message>
<xml_diff>
--- a/fear_n_comfort_supervised.pptx
+++ b/fear_n_comfort_supervised.pptx
@@ -9517,7 +9517,11 @@
             </a:r>
             <a:r>
               <a:rPr lang="en-US" sz="1400" b="1" dirty="0"/>
-              <a:t>:</a:t>
+              <a:t>: </a:t>
+            </a:r>
+            <a:r>
+              <a:rPr lang="en-CA" sz="1400" dirty="0"/>
+              <a:t>Total COVID cases since inception.</a:t>
             </a:r>
             <a:endParaRPr lang="en-US" sz="1400" dirty="0"/>
           </a:p>
@@ -9544,7 +9548,11 @@
             </a:r>
             <a:r>
               <a:rPr lang="en-US" sz="1400" b="1" dirty="0"/>
-              <a:t>:</a:t>
+              <a:t>: </a:t>
+            </a:r>
+            <a:r>
+              <a:rPr lang="en-CA" sz="1400" dirty="0"/>
+              <a:t>Number of new cases reported for the day.</a:t>
             </a:r>
             <a:endParaRPr lang="en-US" sz="1400" dirty="0"/>
           </a:p>
@@ -9573,6 +9581,14 @@
               <a:rPr lang="en-US" sz="1400" b="1" dirty="0"/>
               <a:t>:</a:t>
             </a:r>
+            <a:r>
+              <a:rPr lang="en-US" sz="1400" dirty="0"/>
+              <a:t> </a:t>
+            </a:r>
+            <a:r>
+              <a:rPr lang="en-CA" sz="1400" dirty="0"/>
+              <a:t>Total deaths since inception.</a:t>
+            </a:r>
             <a:endParaRPr lang="en-US" sz="1400" dirty="0"/>
           </a:p>
           <a:p>
@@ -9598,7 +9614,11 @@
             </a:r>
             <a:r>
               <a:rPr lang="en-US" sz="1400" b="1" dirty="0"/>
-              <a:t>:</a:t>
+              <a:t>: </a:t>
+            </a:r>
+            <a:r>
+              <a:rPr lang="en-CA" sz="1400" dirty="0"/>
+              <a:t>Number of new deaths reported for the day.</a:t>
             </a:r>
             <a:endParaRPr lang="en-US" sz="1400" dirty="0"/>
           </a:p>
@@ -10286,7 +10306,7 @@
         </p:blipFill>
         <p:spPr>
           <a:xfrm>
-            <a:off x="6619710" y="3535186"/>
+            <a:off x="6378729" y="3549007"/>
             <a:ext cx="3941142" cy="2309199"/>
           </a:xfrm>
           <a:prstGeom prst="rect">
@@ -10903,7 +10923,7 @@
         </p:blipFill>
         <p:spPr>
           <a:xfrm>
-            <a:off x="819150" y="2954264"/>
+            <a:off x="926727" y="3276994"/>
             <a:ext cx="10553700" cy="2173435"/>
           </a:xfrm>
         </p:spPr>
@@ -11958,7 +11978,7 @@
         </p:blipFill>
         <p:spPr>
           <a:xfrm>
-            <a:off x="6919991" y="963704"/>
+            <a:off x="6919991" y="974462"/>
             <a:ext cx="3509319" cy="2465296"/>
           </a:xfrm>
           <a:prstGeom prst="rect">
@@ -11988,7 +12008,7 @@
         </p:blipFill>
         <p:spPr>
           <a:xfrm>
-            <a:off x="6239159" y="3341247"/>
+            <a:off x="6239159" y="3352005"/>
             <a:ext cx="4349162" cy="2533386"/>
           </a:xfrm>
           <a:prstGeom prst="rect">

</xml_diff>